<commit_message>
Updated the tex file with the latest changes
</commit_message>
<xml_diff>
--- a/Seismic Drones/CASE-2016/pictures/Overview.pptx
+++ b/Seismic Drones/CASE-2016/pictures/Overview.pptx
@@ -243,7 +243,7 @@
           <a:p>
             <a:fld id="{1124D794-5872-47EC-97FC-1653D6C87155}" type="datetimeFigureOut">
               <a:rPr lang="en-US" smtClean="0"/>
-              <a:t>3/5/2016</a:t>
+              <a:t>3/8/2016</a:t>
             </a:fld>
             <a:endParaRPr lang="en-US"/>
           </a:p>
@@ -413,7 +413,7 @@
           <a:p>
             <a:fld id="{1124D794-5872-47EC-97FC-1653D6C87155}" type="datetimeFigureOut">
               <a:rPr lang="en-US" smtClean="0"/>
-              <a:t>3/5/2016</a:t>
+              <a:t>3/8/2016</a:t>
             </a:fld>
             <a:endParaRPr lang="en-US"/>
           </a:p>
@@ -593,7 +593,7 @@
           <a:p>
             <a:fld id="{1124D794-5872-47EC-97FC-1653D6C87155}" type="datetimeFigureOut">
               <a:rPr lang="en-US" smtClean="0"/>
-              <a:t>3/5/2016</a:t>
+              <a:t>3/8/2016</a:t>
             </a:fld>
             <a:endParaRPr lang="en-US"/>
           </a:p>
@@ -763,7 +763,7 @@
           <a:p>
             <a:fld id="{1124D794-5872-47EC-97FC-1653D6C87155}" type="datetimeFigureOut">
               <a:rPr lang="en-US" smtClean="0"/>
-              <a:t>3/5/2016</a:t>
+              <a:t>3/8/2016</a:t>
             </a:fld>
             <a:endParaRPr lang="en-US"/>
           </a:p>
@@ -1007,7 +1007,7 @@
           <a:p>
             <a:fld id="{1124D794-5872-47EC-97FC-1653D6C87155}" type="datetimeFigureOut">
               <a:rPr lang="en-US" smtClean="0"/>
-              <a:t>3/5/2016</a:t>
+              <a:t>3/8/2016</a:t>
             </a:fld>
             <a:endParaRPr lang="en-US"/>
           </a:p>
@@ -1239,7 +1239,7 @@
           <a:p>
             <a:fld id="{1124D794-5872-47EC-97FC-1653D6C87155}" type="datetimeFigureOut">
               <a:rPr lang="en-US" smtClean="0"/>
-              <a:t>3/5/2016</a:t>
+              <a:t>3/8/2016</a:t>
             </a:fld>
             <a:endParaRPr lang="en-US"/>
           </a:p>
@@ -1606,7 +1606,7 @@
           <a:p>
             <a:fld id="{1124D794-5872-47EC-97FC-1653D6C87155}" type="datetimeFigureOut">
               <a:rPr lang="en-US" smtClean="0"/>
-              <a:t>3/5/2016</a:t>
+              <a:t>3/8/2016</a:t>
             </a:fld>
             <a:endParaRPr lang="en-US"/>
           </a:p>
@@ -1724,7 +1724,7 @@
           <a:p>
             <a:fld id="{1124D794-5872-47EC-97FC-1653D6C87155}" type="datetimeFigureOut">
               <a:rPr lang="en-US" smtClean="0"/>
-              <a:t>3/5/2016</a:t>
+              <a:t>3/8/2016</a:t>
             </a:fld>
             <a:endParaRPr lang="en-US"/>
           </a:p>
@@ -1819,7 +1819,7 @@
           <a:p>
             <a:fld id="{1124D794-5872-47EC-97FC-1653D6C87155}" type="datetimeFigureOut">
               <a:rPr lang="en-US" smtClean="0"/>
-              <a:t>3/5/2016</a:t>
+              <a:t>3/8/2016</a:t>
             </a:fld>
             <a:endParaRPr lang="en-US"/>
           </a:p>
@@ -2096,7 +2096,7 @@
           <a:p>
             <a:fld id="{1124D794-5872-47EC-97FC-1653D6C87155}" type="datetimeFigureOut">
               <a:rPr lang="en-US" smtClean="0"/>
-              <a:t>3/5/2016</a:t>
+              <a:t>3/8/2016</a:t>
             </a:fld>
             <a:endParaRPr lang="en-US"/>
           </a:p>
@@ -2353,7 +2353,7 @@
           <a:p>
             <a:fld id="{1124D794-5872-47EC-97FC-1653D6C87155}" type="datetimeFigureOut">
               <a:rPr lang="en-US" smtClean="0"/>
-              <a:t>3/5/2016</a:t>
+              <a:t>3/8/2016</a:t>
             </a:fld>
             <a:endParaRPr lang="en-US"/>
           </a:p>
@@ -2566,7 +2566,7 @@
           <a:p>
             <a:fld id="{1124D794-5872-47EC-97FC-1653D6C87155}" type="datetimeFigureOut">
               <a:rPr lang="en-US" smtClean="0"/>
-              <a:t>3/5/2016</a:t>
+              <a:t>3/8/2016</a:t>
             </a:fld>
             <a:endParaRPr lang="en-US"/>
           </a:p>
@@ -3000,6 +3000,100 @@
           </a:prstGeom>
         </p:spPr>
       </p:pic>
+      <p:grpSp>
+        <p:nvGrpSpPr>
+          <p:cNvPr id="61" name="Group 60"/>
+          <p:cNvGrpSpPr/>
+          <p:nvPr/>
+        </p:nvGrpSpPr>
+        <p:grpSpPr>
+          <a:xfrm>
+            <a:off x="5248542" y="854431"/>
+            <a:ext cx="1871820" cy="650772"/>
+            <a:chOff x="7312474" y="1047985"/>
+            <a:chExt cx="1871820" cy="650772"/>
+          </a:xfrm>
+        </p:grpSpPr>
+        <p:sp>
+          <p:nvSpPr>
+            <p:cNvPr id="55" name="Rectangle 54"/>
+            <p:cNvSpPr/>
+            <p:nvPr/>
+          </p:nvSpPr>
+          <p:spPr>
+            <a:xfrm>
+              <a:off x="7358194" y="1047985"/>
+              <a:ext cx="1802981" cy="650772"/>
+            </a:xfrm>
+            <a:prstGeom prst="rect">
+              <a:avLst/>
+            </a:prstGeom>
+            <a:solidFill>
+              <a:schemeClr val="accent1">
+                <a:alpha val="60000"/>
+              </a:schemeClr>
+            </a:solidFill>
+          </p:spPr>
+          <p:style>
+            <a:lnRef idx="2">
+              <a:schemeClr val="accent1">
+                <a:shade val="50000"/>
+              </a:schemeClr>
+            </a:lnRef>
+            <a:fillRef idx="1">
+              <a:schemeClr val="accent1"/>
+            </a:fillRef>
+            <a:effectRef idx="0">
+              <a:schemeClr val="accent1"/>
+            </a:effectRef>
+            <a:fontRef idx="minor">
+              <a:schemeClr val="lt1"/>
+            </a:fontRef>
+          </p:style>
+          <p:txBody>
+            <a:bodyPr rtlCol="0" anchor="ctr"/>
+            <a:lstStyle/>
+            <a:p>
+              <a:pPr algn="ctr"/>
+              <a:endParaRPr lang="en-US"/>
+            </a:p>
+          </p:txBody>
+        </p:sp>
+        <p:sp>
+          <p:nvSpPr>
+            <p:cNvPr id="18" name="TextBox 17"/>
+            <p:cNvSpPr txBox="1"/>
+            <p:nvPr/>
+          </p:nvSpPr>
+          <p:spPr>
+            <a:xfrm>
+              <a:off x="7312474" y="1052426"/>
+              <a:ext cx="1871820" cy="646331"/>
+            </a:xfrm>
+            <a:prstGeom prst="rect">
+              <a:avLst/>
+            </a:prstGeom>
+            <a:noFill/>
+          </p:spPr>
+          <p:txBody>
+            <a:bodyPr wrap="square" rtlCol="0">
+              <a:spAutoFit/>
+            </a:bodyPr>
+            <a:lstStyle/>
+            <a:p>
+              <a:pPr algn="ctr"/>
+              <a:r>
+                <a:rPr lang="en-US" sz="1800" dirty="0">
+                  <a:solidFill>
+                    <a:schemeClr val="bg1"/>
+                  </a:solidFill>
+                </a:rPr>
+                <a:t>Traditional Cabled Geophones</a:t>
+              </a:r>
+            </a:p>
+          </p:txBody>
+        </p:sp>
+      </p:grpSp>
       <p:pic>
         <p:nvPicPr>
           <p:cNvPr id="21" name="Picture 20"/>
@@ -3185,15 +3279,13 @@
       <p:cxnSp>
         <p:nvCxnSpPr>
           <p:cNvPr id="10" name="Straight Arrow Connector 9"/>
-          <p:cNvCxnSpPr>
-            <a:stCxn id="8" idx="7"/>
-          </p:cNvCxnSpPr>
+          <p:cNvCxnSpPr/>
           <p:nvPr/>
         </p:nvCxnSpPr>
         <p:spPr>
-          <a:xfrm flipV="1">
-            <a:off x="767928" y="415565"/>
-            <a:ext cx="976433" cy="1835284"/>
+          <a:xfrm flipH="1" flipV="1">
+            <a:off x="5298859" y="604191"/>
+            <a:ext cx="885593" cy="275266"/>
           </a:xfrm>
           <a:prstGeom prst="straightConnector1">
             <a:avLst/>
@@ -3220,40 +3312,6 @@
           </a:fontRef>
         </p:style>
       </p:cxnSp>
-      <p:sp>
-        <p:nvSpPr>
-          <p:cNvPr id="18" name="TextBox 17"/>
-          <p:cNvSpPr txBox="1"/>
-          <p:nvPr/>
-        </p:nvSpPr>
-        <p:spPr>
-          <a:xfrm>
-            <a:off x="361504" y="60556"/>
-            <a:ext cx="3393766" cy="369332"/>
-          </a:xfrm>
-          <a:prstGeom prst="rect">
-            <a:avLst/>
-          </a:prstGeom>
-          <a:noFill/>
-        </p:spPr>
-        <p:txBody>
-          <a:bodyPr wrap="square" rtlCol="0">
-            <a:spAutoFit/>
-          </a:bodyPr>
-          <a:lstStyle/>
-          <a:p>
-            <a:pPr algn="ctr"/>
-            <a:r>
-              <a:rPr lang="en-US" sz="1800" dirty="0">
-                <a:solidFill>
-                  <a:schemeClr val="bg1"/>
-                </a:solidFill>
-              </a:rPr>
-              <a:t>Traditional Cabled Geophones</a:t>
-            </a:r>
-          </a:p>
-        </p:txBody>
-      </p:sp>
       <p:sp>
         <p:nvSpPr>
           <p:cNvPr id="7" name="TextBox 6"/>
@@ -3692,16 +3750,967 @@
           </a:p>
         </p:txBody>
       </p:sp>
-      <p:sp>
-        <p:nvSpPr>
-          <p:cNvPr id="40" name="Oval 39"/>
+      <p:cxnSp>
+        <p:nvCxnSpPr>
+          <p:cNvPr id="4" name="Straight Connector 3"/>
+          <p:cNvCxnSpPr>
+            <a:endCxn id="8" idx="0"/>
+          </p:cNvCxnSpPr>
+          <p:nvPr/>
+        </p:nvCxnSpPr>
+        <p:spPr>
+          <a:xfrm flipH="1">
+            <a:off x="559125" y="1529554"/>
+            <a:ext cx="49965" cy="628094"/>
+          </a:xfrm>
+          <a:prstGeom prst="line">
+            <a:avLst/>
+          </a:prstGeom>
+          <a:ln w="28575">
+            <a:solidFill>
+              <a:schemeClr val="bg1"/>
+            </a:solidFill>
+          </a:ln>
+        </p:spPr>
+        <p:style>
+          <a:lnRef idx="1">
+            <a:schemeClr val="accent1"/>
+          </a:lnRef>
+          <a:fillRef idx="0">
+            <a:schemeClr val="accent1"/>
+          </a:fillRef>
+          <a:effectRef idx="0">
+            <a:schemeClr val="accent1"/>
+          </a:effectRef>
+          <a:fontRef idx="minor">
+            <a:schemeClr val="tx1"/>
+          </a:fontRef>
+        </p:style>
+      </p:cxnSp>
+      <p:cxnSp>
+        <p:nvCxnSpPr>
+          <p:cNvPr id="27" name="Straight Connector 26"/>
+          <p:cNvCxnSpPr/>
+          <p:nvPr/>
+        </p:nvCxnSpPr>
+        <p:spPr>
+          <a:xfrm flipH="1">
+            <a:off x="1976912" y="901460"/>
+            <a:ext cx="49965" cy="628094"/>
+          </a:xfrm>
+          <a:prstGeom prst="line">
+            <a:avLst/>
+          </a:prstGeom>
+          <a:ln w="28575">
+            <a:solidFill>
+              <a:schemeClr val="bg1"/>
+            </a:solidFill>
+          </a:ln>
+        </p:spPr>
+        <p:style>
+          <a:lnRef idx="1">
+            <a:schemeClr val="accent1"/>
+          </a:lnRef>
+          <a:fillRef idx="0">
+            <a:schemeClr val="accent1"/>
+          </a:fillRef>
+          <a:effectRef idx="0">
+            <a:schemeClr val="accent1"/>
+          </a:effectRef>
+          <a:fontRef idx="minor">
+            <a:schemeClr val="tx1"/>
+          </a:fontRef>
+        </p:style>
+      </p:cxnSp>
+      <p:cxnSp>
+        <p:nvCxnSpPr>
+          <p:cNvPr id="28" name="Straight Connector 27"/>
+          <p:cNvCxnSpPr>
+            <a:endCxn id="14" idx="0"/>
+          </p:cNvCxnSpPr>
+          <p:nvPr/>
+        </p:nvCxnSpPr>
+        <p:spPr>
+          <a:xfrm>
+            <a:off x="3082755" y="669255"/>
+            <a:ext cx="14595" cy="617351"/>
+          </a:xfrm>
+          <a:prstGeom prst="line">
+            <a:avLst/>
+          </a:prstGeom>
+          <a:ln w="28575">
+            <a:solidFill>
+              <a:schemeClr val="bg1"/>
+            </a:solidFill>
+          </a:ln>
+        </p:spPr>
+        <p:style>
+          <a:lnRef idx="1">
+            <a:schemeClr val="accent1"/>
+          </a:lnRef>
+          <a:fillRef idx="0">
+            <a:schemeClr val="accent1"/>
+          </a:fillRef>
+          <a:effectRef idx="0">
+            <a:schemeClr val="accent1"/>
+          </a:effectRef>
+          <a:fontRef idx="minor">
+            <a:schemeClr val="tx1"/>
+          </a:fontRef>
+        </p:style>
+      </p:cxnSp>
+      <p:cxnSp>
+        <p:nvCxnSpPr>
+          <p:cNvPr id="30" name="Straight Connector 29"/>
+          <p:cNvCxnSpPr/>
+          <p:nvPr/>
+        </p:nvCxnSpPr>
+        <p:spPr>
+          <a:xfrm flipH="1">
+            <a:off x="3846564" y="320720"/>
+            <a:ext cx="19220" cy="566943"/>
+          </a:xfrm>
+          <a:prstGeom prst="line">
+            <a:avLst/>
+          </a:prstGeom>
+          <a:ln w="28575">
+            <a:solidFill>
+              <a:schemeClr val="bg1"/>
+            </a:solidFill>
+          </a:ln>
+        </p:spPr>
+        <p:style>
+          <a:lnRef idx="1">
+            <a:schemeClr val="accent1"/>
+          </a:lnRef>
+          <a:fillRef idx="0">
+            <a:schemeClr val="accent1"/>
+          </a:fillRef>
+          <a:effectRef idx="0">
+            <a:schemeClr val="accent1"/>
+          </a:effectRef>
+          <a:fontRef idx="minor">
+            <a:schemeClr val="tx1"/>
+          </a:fontRef>
+        </p:style>
+      </p:cxnSp>
+      <p:cxnSp>
+        <p:nvCxnSpPr>
+          <p:cNvPr id="35" name="Straight Connector 34"/>
+          <p:cNvCxnSpPr/>
+          <p:nvPr/>
+        </p:nvCxnSpPr>
+        <p:spPr>
+          <a:xfrm>
+            <a:off x="4314856" y="245222"/>
+            <a:ext cx="1" cy="387525"/>
+          </a:xfrm>
+          <a:prstGeom prst="line">
+            <a:avLst/>
+          </a:prstGeom>
+          <a:ln w="28575">
+            <a:solidFill>
+              <a:schemeClr val="bg1"/>
+            </a:solidFill>
+          </a:ln>
+        </p:spPr>
+        <p:style>
+          <a:lnRef idx="1">
+            <a:schemeClr val="accent1"/>
+          </a:lnRef>
+          <a:fillRef idx="0">
+            <a:schemeClr val="accent1"/>
+          </a:fillRef>
+          <a:effectRef idx="0">
+            <a:schemeClr val="accent1"/>
+          </a:effectRef>
+          <a:fontRef idx="minor">
+            <a:schemeClr val="tx1"/>
+          </a:fontRef>
+        </p:style>
+      </p:cxnSp>
+      <p:cxnSp>
+        <p:nvCxnSpPr>
+          <p:cNvPr id="36" name="Straight Connector 35"/>
+          <p:cNvCxnSpPr/>
+          <p:nvPr/>
+        </p:nvCxnSpPr>
+        <p:spPr>
+          <a:xfrm>
+            <a:off x="4733185" y="214535"/>
+            <a:ext cx="0" cy="212370"/>
+          </a:xfrm>
+          <a:prstGeom prst="line">
+            <a:avLst/>
+          </a:prstGeom>
+          <a:ln w="28575">
+            <a:solidFill>
+              <a:schemeClr val="bg1"/>
+            </a:solidFill>
+          </a:ln>
+        </p:spPr>
+        <p:style>
+          <a:lnRef idx="1">
+            <a:schemeClr val="accent1"/>
+          </a:lnRef>
+          <a:fillRef idx="0">
+            <a:schemeClr val="accent1"/>
+          </a:fillRef>
+          <a:effectRef idx="0">
+            <a:schemeClr val="accent1"/>
+          </a:effectRef>
+          <a:fontRef idx="minor">
+            <a:schemeClr val="tx1"/>
+          </a:fontRef>
+        </p:style>
+      </p:cxnSp>
+      <p:cxnSp>
+        <p:nvCxnSpPr>
+          <p:cNvPr id="37" name="Straight Connector 36"/>
+          <p:cNvCxnSpPr/>
+          <p:nvPr/>
+        </p:nvCxnSpPr>
+        <p:spPr>
+          <a:xfrm flipH="1">
+            <a:off x="5118687" y="96896"/>
+            <a:ext cx="8030" cy="192002"/>
+          </a:xfrm>
+          <a:prstGeom prst="line">
+            <a:avLst/>
+          </a:prstGeom>
+          <a:ln w="28575">
+            <a:solidFill>
+              <a:schemeClr val="bg1"/>
+            </a:solidFill>
+          </a:ln>
+        </p:spPr>
+        <p:style>
+          <a:lnRef idx="1">
+            <a:schemeClr val="accent1"/>
+          </a:lnRef>
+          <a:fillRef idx="0">
+            <a:schemeClr val="accent1"/>
+          </a:fillRef>
+          <a:effectRef idx="0">
+            <a:schemeClr val="accent1"/>
+          </a:effectRef>
+          <a:fontRef idx="minor">
+            <a:schemeClr val="tx1"/>
+          </a:fontRef>
+        </p:style>
+      </p:cxnSp>
+      <p:sp>
+        <p:nvSpPr>
+          <p:cNvPr id="20" name="TextBox 19"/>
+          <p:cNvSpPr txBox="1"/>
+          <p:nvPr/>
+        </p:nvSpPr>
+        <p:spPr>
+          <a:xfrm>
+            <a:off x="1036319" y="821843"/>
+            <a:ext cx="491521" cy="369332"/>
+          </a:xfrm>
+          <a:prstGeom prst="rect">
+            <a:avLst/>
+          </a:prstGeom>
+          <a:noFill/>
+          <a:ln>
+            <a:noFill/>
+          </a:ln>
+        </p:spPr>
+        <p:txBody>
+          <a:bodyPr wrap="square" rtlCol="0">
+            <a:spAutoFit/>
+          </a:bodyPr>
+          <a:lstStyle/>
+          <a:p>
+            <a:r>
+              <a:rPr lang="en-US" sz="1800" dirty="0" smtClean="0">
+                <a:solidFill>
+                  <a:schemeClr val="bg1"/>
+                </a:solidFill>
+              </a:rPr>
+              <a:t>1m</a:t>
+            </a:r>
+            <a:endParaRPr lang="en-US" sz="1800" dirty="0">
+              <a:solidFill>
+                <a:schemeClr val="bg1"/>
+              </a:solidFill>
+            </a:endParaRPr>
+          </a:p>
+        </p:txBody>
+      </p:sp>
+      <p:cxnSp>
+        <p:nvCxnSpPr>
+          <p:cNvPr id="39" name="Straight Arrow Connector 38"/>
+          <p:cNvCxnSpPr/>
+          <p:nvPr/>
+        </p:nvCxnSpPr>
+        <p:spPr>
+          <a:xfrm flipV="1">
+            <a:off x="682255" y="930120"/>
+            <a:ext cx="1287043" cy="630318"/>
+          </a:xfrm>
+          <a:prstGeom prst="straightConnector1">
+            <a:avLst/>
+          </a:prstGeom>
+          <a:ln w="28575">
+            <a:solidFill>
+              <a:schemeClr val="bg1"/>
+            </a:solidFill>
+            <a:headEnd type="triangle"/>
+            <a:tailEnd type="triangle"/>
+          </a:ln>
+        </p:spPr>
+        <p:style>
+          <a:lnRef idx="1">
+            <a:schemeClr val="accent1"/>
+          </a:lnRef>
+          <a:fillRef idx="0">
+            <a:schemeClr val="accent1"/>
+          </a:fillRef>
+          <a:effectRef idx="0">
+            <a:schemeClr val="accent1"/>
+          </a:effectRef>
+          <a:fontRef idx="minor">
+            <a:schemeClr val="tx1"/>
+          </a:fontRef>
+        </p:style>
+      </p:cxnSp>
+      <p:cxnSp>
+        <p:nvCxnSpPr>
+          <p:cNvPr id="41" name="Straight Arrow Connector 40"/>
+          <p:cNvCxnSpPr/>
+          <p:nvPr/>
+        </p:nvCxnSpPr>
+        <p:spPr>
+          <a:xfrm flipV="1">
+            <a:off x="2046404" y="684752"/>
+            <a:ext cx="998967" cy="254738"/>
+          </a:xfrm>
+          <a:prstGeom prst="straightConnector1">
+            <a:avLst/>
+          </a:prstGeom>
+          <a:ln w="28575">
+            <a:solidFill>
+              <a:schemeClr val="bg1"/>
+            </a:solidFill>
+            <a:headEnd type="triangle"/>
+            <a:tailEnd type="triangle"/>
+          </a:ln>
+        </p:spPr>
+        <p:style>
+          <a:lnRef idx="1">
+            <a:schemeClr val="accent1"/>
+          </a:lnRef>
+          <a:fillRef idx="0">
+            <a:schemeClr val="accent1"/>
+          </a:fillRef>
+          <a:effectRef idx="0">
+            <a:schemeClr val="accent1"/>
+          </a:effectRef>
+          <a:fontRef idx="minor">
+            <a:schemeClr val="tx1"/>
+          </a:fontRef>
+        </p:style>
+      </p:cxnSp>
+      <p:cxnSp>
+        <p:nvCxnSpPr>
+          <p:cNvPr id="43" name="Straight Arrow Connector 42"/>
+          <p:cNvCxnSpPr/>
+          <p:nvPr/>
+        </p:nvCxnSpPr>
+        <p:spPr>
+          <a:xfrm flipV="1">
+            <a:off x="3119474" y="339281"/>
+            <a:ext cx="743633" cy="340723"/>
+          </a:xfrm>
+          <a:prstGeom prst="straightConnector1">
+            <a:avLst/>
+          </a:prstGeom>
+          <a:ln w="28575">
+            <a:solidFill>
+              <a:schemeClr val="bg1"/>
+            </a:solidFill>
+            <a:headEnd type="triangle"/>
+            <a:tailEnd type="triangle"/>
+          </a:ln>
+        </p:spPr>
+        <p:style>
+          <a:lnRef idx="1">
+            <a:schemeClr val="accent1"/>
+          </a:lnRef>
+          <a:fillRef idx="0">
+            <a:schemeClr val="accent1"/>
+          </a:fillRef>
+          <a:effectRef idx="0">
+            <a:schemeClr val="accent1"/>
+          </a:effectRef>
+          <a:fontRef idx="minor">
+            <a:schemeClr val="tx1"/>
+          </a:fontRef>
+        </p:style>
+      </p:cxnSp>
+      <p:cxnSp>
+        <p:nvCxnSpPr>
+          <p:cNvPr id="45" name="Straight Arrow Connector 44"/>
+          <p:cNvCxnSpPr/>
+          <p:nvPr/>
+        </p:nvCxnSpPr>
+        <p:spPr>
+          <a:xfrm flipV="1">
+            <a:off x="3896223" y="237936"/>
+            <a:ext cx="387889" cy="120345"/>
+          </a:xfrm>
+          <a:prstGeom prst="straightConnector1">
+            <a:avLst/>
+          </a:prstGeom>
+          <a:ln w="28575">
+            <a:solidFill>
+              <a:schemeClr val="bg1"/>
+            </a:solidFill>
+            <a:headEnd type="triangle"/>
+            <a:tailEnd type="triangle"/>
+          </a:ln>
+        </p:spPr>
+        <p:style>
+          <a:lnRef idx="1">
+            <a:schemeClr val="accent1"/>
+          </a:lnRef>
+          <a:fillRef idx="0">
+            <a:schemeClr val="accent1"/>
+          </a:fillRef>
+          <a:effectRef idx="0">
+            <a:schemeClr val="accent1"/>
+          </a:effectRef>
+          <a:fontRef idx="minor">
+            <a:schemeClr val="tx1"/>
+          </a:fontRef>
+        </p:style>
+      </p:cxnSp>
+      <p:cxnSp>
+        <p:nvCxnSpPr>
+          <p:cNvPr id="47" name="Straight Arrow Connector 46"/>
+          <p:cNvCxnSpPr/>
+          <p:nvPr/>
+        </p:nvCxnSpPr>
+        <p:spPr>
+          <a:xfrm flipV="1">
+            <a:off x="4335383" y="204022"/>
+            <a:ext cx="396609" cy="60173"/>
+          </a:xfrm>
+          <a:prstGeom prst="straightConnector1">
+            <a:avLst/>
+          </a:prstGeom>
+          <a:ln w="28575">
+            <a:solidFill>
+              <a:schemeClr val="bg1"/>
+            </a:solidFill>
+            <a:headEnd type="triangle"/>
+            <a:tailEnd type="triangle"/>
+          </a:ln>
+        </p:spPr>
+        <p:style>
+          <a:lnRef idx="1">
+            <a:schemeClr val="accent1"/>
+          </a:lnRef>
+          <a:fillRef idx="0">
+            <a:schemeClr val="accent1"/>
+          </a:fillRef>
+          <a:effectRef idx="0">
+            <a:schemeClr val="accent1"/>
+          </a:effectRef>
+          <a:fontRef idx="minor">
+            <a:schemeClr val="tx1"/>
+          </a:fontRef>
+        </p:style>
+      </p:cxnSp>
+      <p:cxnSp>
+        <p:nvCxnSpPr>
+          <p:cNvPr id="49" name="Straight Arrow Connector 48"/>
+          <p:cNvCxnSpPr/>
+          <p:nvPr/>
+        </p:nvCxnSpPr>
+        <p:spPr>
+          <a:xfrm flipV="1">
+            <a:off x="4731992" y="119916"/>
+            <a:ext cx="396609" cy="60173"/>
+          </a:xfrm>
+          <a:prstGeom prst="straightConnector1">
+            <a:avLst/>
+          </a:prstGeom>
+          <a:ln w="28575">
+            <a:solidFill>
+              <a:schemeClr val="bg1"/>
+            </a:solidFill>
+            <a:headEnd type="triangle"/>
+            <a:tailEnd type="triangle"/>
+          </a:ln>
+        </p:spPr>
+        <p:style>
+          <a:lnRef idx="1">
+            <a:schemeClr val="accent1"/>
+          </a:lnRef>
+          <a:fillRef idx="0">
+            <a:schemeClr val="accent1"/>
+          </a:fillRef>
+          <a:effectRef idx="0">
+            <a:schemeClr val="accent1"/>
+          </a:effectRef>
+          <a:fontRef idx="minor">
+            <a:schemeClr val="tx1"/>
+          </a:fontRef>
+        </p:style>
+      </p:cxnSp>
+      <p:sp>
+        <p:nvSpPr>
+          <p:cNvPr id="50" name="TextBox 49"/>
+          <p:cNvSpPr txBox="1"/>
+          <p:nvPr/>
+        </p:nvSpPr>
+        <p:spPr>
+          <a:xfrm>
+            <a:off x="2233324" y="484589"/>
+            <a:ext cx="491521" cy="369332"/>
+          </a:xfrm>
+          <a:prstGeom prst="rect">
+            <a:avLst/>
+          </a:prstGeom>
+          <a:noFill/>
+          <a:ln>
+            <a:noFill/>
+          </a:ln>
+        </p:spPr>
+        <p:txBody>
+          <a:bodyPr wrap="square" rtlCol="0">
+            <a:spAutoFit/>
+          </a:bodyPr>
+          <a:lstStyle/>
+          <a:p>
+            <a:r>
+              <a:rPr lang="en-US" sz="1800" dirty="0" smtClean="0">
+                <a:solidFill>
+                  <a:schemeClr val="bg1"/>
+                </a:solidFill>
+              </a:rPr>
+              <a:t>1m</a:t>
+            </a:r>
+            <a:endParaRPr lang="en-US" sz="1800" dirty="0">
+              <a:solidFill>
+                <a:schemeClr val="bg1"/>
+              </a:solidFill>
+            </a:endParaRPr>
+          </a:p>
+        </p:txBody>
+      </p:sp>
+      <p:sp>
+        <p:nvSpPr>
+          <p:cNvPr id="51" name="TextBox 50"/>
+          <p:cNvSpPr txBox="1"/>
+          <p:nvPr/>
+        </p:nvSpPr>
+        <p:spPr>
+          <a:xfrm>
+            <a:off x="3126229" y="214535"/>
+            <a:ext cx="491521" cy="369332"/>
+          </a:xfrm>
+          <a:prstGeom prst="rect">
+            <a:avLst/>
+          </a:prstGeom>
+          <a:noFill/>
+          <a:ln>
+            <a:noFill/>
+          </a:ln>
+        </p:spPr>
+        <p:txBody>
+          <a:bodyPr wrap="square" rtlCol="0">
+            <a:spAutoFit/>
+          </a:bodyPr>
+          <a:lstStyle/>
+          <a:p>
+            <a:r>
+              <a:rPr lang="en-US" sz="1800" dirty="0" smtClean="0">
+                <a:solidFill>
+                  <a:schemeClr val="bg1"/>
+                </a:solidFill>
+              </a:rPr>
+              <a:t>1m</a:t>
+            </a:r>
+            <a:endParaRPr lang="en-US" sz="1800" dirty="0">
+              <a:solidFill>
+                <a:schemeClr val="bg1"/>
+              </a:solidFill>
+            </a:endParaRPr>
+          </a:p>
+        </p:txBody>
+      </p:sp>
+      <p:grpSp>
+        <p:nvGrpSpPr>
+          <p:cNvPr id="62" name="Group 61"/>
+          <p:cNvGrpSpPr/>
+          <p:nvPr/>
+        </p:nvGrpSpPr>
+        <p:grpSpPr>
+          <a:xfrm>
+            <a:off x="4805745" y="2543184"/>
+            <a:ext cx="1871820" cy="373773"/>
+            <a:chOff x="7465971" y="1905973"/>
+            <a:chExt cx="1871820" cy="373773"/>
+          </a:xfrm>
+        </p:grpSpPr>
+        <p:sp>
+          <p:nvSpPr>
+            <p:cNvPr id="56" name="Rectangle 55"/>
+            <p:cNvSpPr/>
+            <p:nvPr/>
+          </p:nvSpPr>
+          <p:spPr>
+            <a:xfrm>
+              <a:off x="7500390" y="1905973"/>
+              <a:ext cx="1802981" cy="373773"/>
+            </a:xfrm>
+            <a:prstGeom prst="rect">
+              <a:avLst/>
+            </a:prstGeom>
+            <a:solidFill>
+              <a:schemeClr val="accent1">
+                <a:alpha val="60000"/>
+              </a:schemeClr>
+            </a:solidFill>
+          </p:spPr>
+          <p:style>
+            <a:lnRef idx="2">
+              <a:schemeClr val="accent1">
+                <a:shade val="50000"/>
+              </a:schemeClr>
+            </a:lnRef>
+            <a:fillRef idx="1">
+              <a:schemeClr val="accent1"/>
+            </a:fillRef>
+            <a:effectRef idx="0">
+              <a:schemeClr val="accent1"/>
+            </a:effectRef>
+            <a:fontRef idx="minor">
+              <a:schemeClr val="lt1"/>
+            </a:fontRef>
+          </p:style>
+          <p:txBody>
+            <a:bodyPr rtlCol="0" anchor="ctr"/>
+            <a:lstStyle/>
+            <a:p>
+              <a:pPr algn="ctr"/>
+              <a:endParaRPr lang="en-US"/>
+            </a:p>
+          </p:txBody>
+        </p:sp>
+        <p:sp>
+          <p:nvSpPr>
+            <p:cNvPr id="57" name="TextBox 56"/>
+            <p:cNvSpPr txBox="1"/>
+            <p:nvPr/>
+          </p:nvSpPr>
+          <p:spPr>
+            <a:xfrm>
+              <a:off x="7465971" y="1910414"/>
+              <a:ext cx="1871820" cy="369332"/>
+            </a:xfrm>
+            <a:prstGeom prst="rect">
+              <a:avLst/>
+            </a:prstGeom>
+            <a:noFill/>
+          </p:spPr>
+          <p:txBody>
+            <a:bodyPr wrap="square" rtlCol="0">
+              <a:spAutoFit/>
+            </a:bodyPr>
+            <a:lstStyle/>
+            <a:p>
+              <a:pPr algn="ctr"/>
+              <a:r>
+                <a:rPr lang="en-US" sz="1800" dirty="0" smtClean="0">
+                  <a:solidFill>
+                    <a:schemeClr val="bg1"/>
+                  </a:solidFill>
+                </a:rPr>
+                <a:t>Trunk Cables</a:t>
+              </a:r>
+              <a:endParaRPr lang="en-US" sz="1800" dirty="0">
+                <a:solidFill>
+                  <a:schemeClr val="bg1"/>
+                </a:solidFill>
+              </a:endParaRPr>
+            </a:p>
+          </p:txBody>
+        </p:sp>
+      </p:grpSp>
+      <p:grpSp>
+        <p:nvGrpSpPr>
+          <p:cNvPr id="60" name="Group 59"/>
+          <p:cNvGrpSpPr/>
+          <p:nvPr/>
+        </p:nvGrpSpPr>
+        <p:grpSpPr>
+          <a:xfrm>
+            <a:off x="4949914" y="1843601"/>
+            <a:ext cx="1871820" cy="373773"/>
+            <a:chOff x="7536036" y="2709145"/>
+            <a:chExt cx="1871820" cy="373773"/>
+          </a:xfrm>
+        </p:grpSpPr>
+        <p:sp>
+          <p:nvSpPr>
+            <p:cNvPr id="58" name="Rectangle 57"/>
+            <p:cNvSpPr/>
+            <p:nvPr/>
+          </p:nvSpPr>
+          <p:spPr>
+            <a:xfrm>
+              <a:off x="7581756" y="2709145"/>
+              <a:ext cx="1802981" cy="373773"/>
+            </a:xfrm>
+            <a:prstGeom prst="rect">
+              <a:avLst/>
+            </a:prstGeom>
+            <a:solidFill>
+              <a:schemeClr val="accent1">
+                <a:alpha val="60000"/>
+              </a:schemeClr>
+            </a:solidFill>
+          </p:spPr>
+          <p:style>
+            <a:lnRef idx="2">
+              <a:schemeClr val="accent1">
+                <a:shade val="50000"/>
+              </a:schemeClr>
+            </a:lnRef>
+            <a:fillRef idx="1">
+              <a:schemeClr val="accent1"/>
+            </a:fillRef>
+            <a:effectRef idx="0">
+              <a:schemeClr val="accent1"/>
+            </a:effectRef>
+            <a:fontRef idx="minor">
+              <a:schemeClr val="lt1"/>
+            </a:fontRef>
+          </p:style>
+          <p:txBody>
+            <a:bodyPr rtlCol="0" anchor="ctr"/>
+            <a:lstStyle/>
+            <a:p>
+              <a:pPr algn="ctr"/>
+              <a:endParaRPr lang="en-US"/>
+            </a:p>
+          </p:txBody>
+        </p:sp>
+        <p:sp>
+          <p:nvSpPr>
+            <p:cNvPr id="59" name="TextBox 58"/>
+            <p:cNvSpPr txBox="1"/>
+            <p:nvPr/>
+          </p:nvSpPr>
+          <p:spPr>
+            <a:xfrm>
+              <a:off x="7536036" y="2713586"/>
+              <a:ext cx="1871820" cy="369332"/>
+            </a:xfrm>
+            <a:prstGeom prst="rect">
+              <a:avLst/>
+            </a:prstGeom>
+            <a:noFill/>
+          </p:spPr>
+          <p:txBody>
+            <a:bodyPr wrap="square" rtlCol="0">
+              <a:spAutoFit/>
+            </a:bodyPr>
+            <a:lstStyle/>
+            <a:p>
+              <a:pPr algn="ctr"/>
+              <a:r>
+                <a:rPr lang="en-US" sz="1800" dirty="0" smtClean="0">
+                  <a:solidFill>
+                    <a:schemeClr val="bg1"/>
+                  </a:solidFill>
+                </a:rPr>
+                <a:t>Connectors</a:t>
+              </a:r>
+              <a:endParaRPr lang="en-US" sz="1800" dirty="0">
+                <a:solidFill>
+                  <a:schemeClr val="bg1"/>
+                </a:solidFill>
+              </a:endParaRPr>
+            </a:p>
+          </p:txBody>
+        </p:sp>
+      </p:grpSp>
+      <p:cxnSp>
+        <p:nvCxnSpPr>
+          <p:cNvPr id="63" name="Straight Arrow Connector 62"/>
+          <p:cNvCxnSpPr/>
+          <p:nvPr/>
+        </p:nvCxnSpPr>
+        <p:spPr>
+          <a:xfrm flipH="1" flipV="1">
+            <a:off x="4910691" y="1536256"/>
+            <a:ext cx="133075" cy="530606"/>
+          </a:xfrm>
+          <a:prstGeom prst="straightConnector1">
+            <a:avLst/>
+          </a:prstGeom>
+          <a:ln w="28575">
+            <a:solidFill>
+              <a:schemeClr val="bg1"/>
+            </a:solidFill>
+            <a:tailEnd type="triangle"/>
+          </a:ln>
+        </p:spPr>
+        <p:style>
+          <a:lnRef idx="1">
+            <a:schemeClr val="accent1"/>
+          </a:lnRef>
+          <a:fillRef idx="0">
+            <a:schemeClr val="accent1"/>
+          </a:fillRef>
+          <a:effectRef idx="0">
+            <a:schemeClr val="accent1"/>
+          </a:effectRef>
+          <a:fontRef idx="minor">
+            <a:schemeClr val="tx1"/>
+          </a:fontRef>
+        </p:style>
+      </p:cxnSp>
+      <p:cxnSp>
+        <p:nvCxnSpPr>
+          <p:cNvPr id="64" name="Straight Arrow Connector 63"/>
+          <p:cNvCxnSpPr/>
+          <p:nvPr/>
+        </p:nvCxnSpPr>
+        <p:spPr>
+          <a:xfrm flipH="1" flipV="1">
+            <a:off x="4491659" y="1869146"/>
+            <a:ext cx="552107" cy="203773"/>
+          </a:xfrm>
+          <a:prstGeom prst="straightConnector1">
+            <a:avLst/>
+          </a:prstGeom>
+          <a:ln w="28575">
+            <a:solidFill>
+              <a:schemeClr val="bg1"/>
+            </a:solidFill>
+            <a:tailEnd type="triangle"/>
+          </a:ln>
+        </p:spPr>
+        <p:style>
+          <a:lnRef idx="1">
+            <a:schemeClr val="accent1"/>
+          </a:lnRef>
+          <a:fillRef idx="0">
+            <a:schemeClr val="accent1"/>
+          </a:fillRef>
+          <a:effectRef idx="0">
+            <a:schemeClr val="accent1"/>
+          </a:effectRef>
+          <a:fontRef idx="minor">
+            <a:schemeClr val="tx1"/>
+          </a:fontRef>
+        </p:style>
+      </p:cxnSp>
+      <p:cxnSp>
+        <p:nvCxnSpPr>
+          <p:cNvPr id="67" name="Straight Arrow Connector 66"/>
+          <p:cNvCxnSpPr/>
+          <p:nvPr/>
+        </p:nvCxnSpPr>
+        <p:spPr>
+          <a:xfrm flipH="1">
+            <a:off x="3185160" y="2796311"/>
+            <a:ext cx="1620585" cy="65273"/>
+          </a:xfrm>
+          <a:prstGeom prst="straightConnector1">
+            <a:avLst/>
+          </a:prstGeom>
+          <a:ln w="28575">
+            <a:solidFill>
+              <a:schemeClr val="bg1"/>
+            </a:solidFill>
+            <a:tailEnd type="triangle"/>
+          </a:ln>
+        </p:spPr>
+        <p:style>
+          <a:lnRef idx="1">
+            <a:schemeClr val="accent1"/>
+          </a:lnRef>
+          <a:fillRef idx="0">
+            <a:schemeClr val="accent1"/>
+          </a:fillRef>
+          <a:effectRef idx="0">
+            <a:schemeClr val="accent1"/>
+          </a:effectRef>
+          <a:fontRef idx="minor">
+            <a:schemeClr val="tx1"/>
+          </a:fontRef>
+        </p:style>
+      </p:cxnSp>
+      <p:sp>
+        <p:nvSpPr>
+          <p:cNvPr id="69" name="Oval 68"/>
           <p:cNvSpPr/>
           <p:nvPr/>
         </p:nvSpPr>
         <p:spPr>
           <a:xfrm>
-            <a:off x="5398986" y="93100"/>
-            <a:ext cx="353606" cy="391597"/>
+            <a:off x="4186113" y="1686566"/>
+            <a:ext cx="353606" cy="297642"/>
+          </a:xfrm>
+          <a:prstGeom prst="ellipse">
+            <a:avLst/>
+          </a:prstGeom>
+          <a:noFill/>
+          <a:ln>
+            <a:solidFill>
+              <a:schemeClr val="bg1"/>
+            </a:solidFill>
+          </a:ln>
+        </p:spPr>
+        <p:style>
+          <a:lnRef idx="2">
+            <a:schemeClr val="accent1">
+              <a:shade val="50000"/>
+            </a:schemeClr>
+          </a:lnRef>
+          <a:fillRef idx="1">
+            <a:schemeClr val="accent1"/>
+          </a:fillRef>
+          <a:effectRef idx="0">
+            <a:schemeClr val="accent1"/>
+          </a:effectRef>
+          <a:fontRef idx="minor">
+            <a:schemeClr val="lt1"/>
+          </a:fontRef>
+        </p:style>
+        <p:txBody>
+          <a:bodyPr rot="0" spcFirstLastPara="0" vertOverflow="overflow" horzOverflow="overflow" vert="horz" wrap="square" lIns="91440" tIns="45720" rIns="91440" bIns="45720" numCol="1" spcCol="0" rtlCol="0" fromWordArt="0" anchor="ctr" anchorCtr="0" forceAA="0" compatLnSpc="1">
+            <a:prstTxWarp prst="textNoShape">
+              <a:avLst/>
+            </a:prstTxWarp>
+            <a:noAutofit/>
+          </a:bodyPr>
+          <a:lstStyle/>
+          <a:p>
+            <a:pPr algn="ctr"/>
+            <a:endParaRPr lang="en-US"/>
+          </a:p>
+        </p:txBody>
+      </p:sp>
+      <p:sp>
+        <p:nvSpPr>
+          <p:cNvPr id="70" name="Oval 69"/>
+          <p:cNvSpPr/>
+          <p:nvPr/>
+        </p:nvSpPr>
+        <p:spPr>
+          <a:xfrm>
+            <a:off x="4693298" y="1368895"/>
+            <a:ext cx="353606" cy="191543"/>
           </a:xfrm>
           <a:prstGeom prst="ellipse">
             <a:avLst/>

</xml_diff>

<commit_message>
Added the paper with changes.
</commit_message>
<xml_diff>
--- a/Seismic Drones/CASE-2016/pictures/Overview.pptx
+++ b/Seismic Drones/CASE-2016/pictures/Overview.pptx
@@ -243,7 +243,7 @@
           <a:p>
             <a:fld id="{1124D794-5872-47EC-97FC-1653D6C87155}" type="datetimeFigureOut">
               <a:rPr lang="en-US" smtClean="0"/>
-              <a:t>3/8/2016</a:t>
+              <a:t>3/10/2016</a:t>
             </a:fld>
             <a:endParaRPr lang="en-US"/>
           </a:p>
@@ -413,7 +413,7 @@
           <a:p>
             <a:fld id="{1124D794-5872-47EC-97FC-1653D6C87155}" type="datetimeFigureOut">
               <a:rPr lang="en-US" smtClean="0"/>
-              <a:t>3/8/2016</a:t>
+              <a:t>3/10/2016</a:t>
             </a:fld>
             <a:endParaRPr lang="en-US"/>
           </a:p>
@@ -593,7 +593,7 @@
           <a:p>
             <a:fld id="{1124D794-5872-47EC-97FC-1653D6C87155}" type="datetimeFigureOut">
               <a:rPr lang="en-US" smtClean="0"/>
-              <a:t>3/8/2016</a:t>
+              <a:t>3/10/2016</a:t>
             </a:fld>
             <a:endParaRPr lang="en-US"/>
           </a:p>
@@ -763,7 +763,7 @@
           <a:p>
             <a:fld id="{1124D794-5872-47EC-97FC-1653D6C87155}" type="datetimeFigureOut">
               <a:rPr lang="en-US" smtClean="0"/>
-              <a:t>3/8/2016</a:t>
+              <a:t>3/10/2016</a:t>
             </a:fld>
             <a:endParaRPr lang="en-US"/>
           </a:p>
@@ -1007,7 +1007,7 @@
           <a:p>
             <a:fld id="{1124D794-5872-47EC-97FC-1653D6C87155}" type="datetimeFigureOut">
               <a:rPr lang="en-US" smtClean="0"/>
-              <a:t>3/8/2016</a:t>
+              <a:t>3/10/2016</a:t>
             </a:fld>
             <a:endParaRPr lang="en-US"/>
           </a:p>
@@ -1239,7 +1239,7 @@
           <a:p>
             <a:fld id="{1124D794-5872-47EC-97FC-1653D6C87155}" type="datetimeFigureOut">
               <a:rPr lang="en-US" smtClean="0"/>
-              <a:t>3/8/2016</a:t>
+              <a:t>3/10/2016</a:t>
             </a:fld>
             <a:endParaRPr lang="en-US"/>
           </a:p>
@@ -1606,7 +1606,7 @@
           <a:p>
             <a:fld id="{1124D794-5872-47EC-97FC-1653D6C87155}" type="datetimeFigureOut">
               <a:rPr lang="en-US" smtClean="0"/>
-              <a:t>3/8/2016</a:t>
+              <a:t>3/10/2016</a:t>
             </a:fld>
             <a:endParaRPr lang="en-US"/>
           </a:p>
@@ -1724,7 +1724,7 @@
           <a:p>
             <a:fld id="{1124D794-5872-47EC-97FC-1653D6C87155}" type="datetimeFigureOut">
               <a:rPr lang="en-US" smtClean="0"/>
-              <a:t>3/8/2016</a:t>
+              <a:t>3/10/2016</a:t>
             </a:fld>
             <a:endParaRPr lang="en-US"/>
           </a:p>
@@ -1819,7 +1819,7 @@
           <a:p>
             <a:fld id="{1124D794-5872-47EC-97FC-1653D6C87155}" type="datetimeFigureOut">
               <a:rPr lang="en-US" smtClean="0"/>
-              <a:t>3/8/2016</a:t>
+              <a:t>3/10/2016</a:t>
             </a:fld>
             <a:endParaRPr lang="en-US"/>
           </a:p>
@@ -2096,7 +2096,7 @@
           <a:p>
             <a:fld id="{1124D794-5872-47EC-97FC-1653D6C87155}" type="datetimeFigureOut">
               <a:rPr lang="en-US" smtClean="0"/>
-              <a:t>3/8/2016</a:t>
+              <a:t>3/10/2016</a:t>
             </a:fld>
             <a:endParaRPr lang="en-US"/>
           </a:p>
@@ -2353,7 +2353,7 @@
           <a:p>
             <a:fld id="{1124D794-5872-47EC-97FC-1653D6C87155}" type="datetimeFigureOut">
               <a:rPr lang="en-US" smtClean="0"/>
-              <a:t>3/8/2016</a:t>
+              <a:t>3/10/2016</a:t>
             </a:fld>
             <a:endParaRPr lang="en-US"/>
           </a:p>
@@ -2566,7 +2566,7 @@
           <a:p>
             <a:fld id="{1124D794-5872-47EC-97FC-1653D6C87155}" type="datetimeFigureOut">
               <a:rPr lang="en-US" smtClean="0"/>
-              <a:t>3/8/2016</a:t>
+              <a:t>3/10/2016</a:t>
             </a:fld>
             <a:endParaRPr lang="en-US"/>
           </a:p>
@@ -3033,6 +3033,9 @@
                 <a:alpha val="60000"/>
               </a:schemeClr>
             </a:solidFill>
+            <a:ln>
+              <a:noFill/>
+            </a:ln>
           </p:spPr>
           <p:style>
             <a:lnRef idx="2">
@@ -3074,6 +3077,9 @@
               <a:avLst/>
             </a:prstGeom>
             <a:noFill/>
+            <a:ln>
+              <a:noFill/>
+            </a:ln>
           </p:spPr>
           <p:txBody>
             <a:bodyPr wrap="square" rtlCol="0">
@@ -4377,6 +4383,9 @@
                 <a:alpha val="60000"/>
               </a:schemeClr>
             </a:solidFill>
+            <a:ln>
+              <a:noFill/>
+            </a:ln>
           </p:spPr>
           <p:style>
             <a:lnRef idx="2">
@@ -4418,6 +4427,9 @@
               <a:avLst/>
             </a:prstGeom>
             <a:noFill/>
+            <a:ln>
+              <a:noFill/>
+            </a:ln>
           </p:spPr>
           <p:txBody>
             <a:bodyPr wrap="square" rtlCol="0">
@@ -4476,6 +4488,9 @@
                 <a:alpha val="60000"/>
               </a:schemeClr>
             </a:solidFill>
+            <a:ln>
+              <a:noFill/>
+            </a:ln>
           </p:spPr>
           <p:style>
             <a:lnRef idx="2">
@@ -4517,6 +4532,9 @@
               <a:avLst/>
             </a:prstGeom>
             <a:noFill/>
+            <a:ln>
+              <a:noFill/>
+            </a:ln>
           </p:spPr>
           <p:txBody>
             <a:bodyPr wrap="square" rtlCol="0">

</xml_diff>

<commit_message>
Changes made to paper
</commit_message>
<xml_diff>
--- a/Seismic Drones/CASE-2016/pictures/Overview.pptx
+++ b/Seismic Drones/CASE-2016/pictures/Overview.pptx
@@ -243,7 +243,7 @@
           <a:p>
             <a:fld id="{1124D794-5872-47EC-97FC-1653D6C87155}" type="datetimeFigureOut">
               <a:rPr lang="en-US" smtClean="0"/>
-              <a:t>3/10/2016</a:t>
+              <a:t>3/21/2016</a:t>
             </a:fld>
             <a:endParaRPr lang="en-US"/>
           </a:p>
@@ -413,7 +413,7 @@
           <a:p>
             <a:fld id="{1124D794-5872-47EC-97FC-1653D6C87155}" type="datetimeFigureOut">
               <a:rPr lang="en-US" smtClean="0"/>
-              <a:t>3/10/2016</a:t>
+              <a:t>3/21/2016</a:t>
             </a:fld>
             <a:endParaRPr lang="en-US"/>
           </a:p>
@@ -593,7 +593,7 @@
           <a:p>
             <a:fld id="{1124D794-5872-47EC-97FC-1653D6C87155}" type="datetimeFigureOut">
               <a:rPr lang="en-US" smtClean="0"/>
-              <a:t>3/10/2016</a:t>
+              <a:t>3/21/2016</a:t>
             </a:fld>
             <a:endParaRPr lang="en-US"/>
           </a:p>
@@ -763,7 +763,7 @@
           <a:p>
             <a:fld id="{1124D794-5872-47EC-97FC-1653D6C87155}" type="datetimeFigureOut">
               <a:rPr lang="en-US" smtClean="0"/>
-              <a:t>3/10/2016</a:t>
+              <a:t>3/21/2016</a:t>
             </a:fld>
             <a:endParaRPr lang="en-US"/>
           </a:p>
@@ -1007,7 +1007,7 @@
           <a:p>
             <a:fld id="{1124D794-5872-47EC-97FC-1653D6C87155}" type="datetimeFigureOut">
               <a:rPr lang="en-US" smtClean="0"/>
-              <a:t>3/10/2016</a:t>
+              <a:t>3/21/2016</a:t>
             </a:fld>
             <a:endParaRPr lang="en-US"/>
           </a:p>
@@ -1239,7 +1239,7 @@
           <a:p>
             <a:fld id="{1124D794-5872-47EC-97FC-1653D6C87155}" type="datetimeFigureOut">
               <a:rPr lang="en-US" smtClean="0"/>
-              <a:t>3/10/2016</a:t>
+              <a:t>3/21/2016</a:t>
             </a:fld>
             <a:endParaRPr lang="en-US"/>
           </a:p>
@@ -1606,7 +1606,7 @@
           <a:p>
             <a:fld id="{1124D794-5872-47EC-97FC-1653D6C87155}" type="datetimeFigureOut">
               <a:rPr lang="en-US" smtClean="0"/>
-              <a:t>3/10/2016</a:t>
+              <a:t>3/21/2016</a:t>
             </a:fld>
             <a:endParaRPr lang="en-US"/>
           </a:p>
@@ -1724,7 +1724,7 @@
           <a:p>
             <a:fld id="{1124D794-5872-47EC-97FC-1653D6C87155}" type="datetimeFigureOut">
               <a:rPr lang="en-US" smtClean="0"/>
-              <a:t>3/10/2016</a:t>
+              <a:t>3/21/2016</a:t>
             </a:fld>
             <a:endParaRPr lang="en-US"/>
           </a:p>
@@ -1819,7 +1819,7 @@
           <a:p>
             <a:fld id="{1124D794-5872-47EC-97FC-1653D6C87155}" type="datetimeFigureOut">
               <a:rPr lang="en-US" smtClean="0"/>
-              <a:t>3/10/2016</a:t>
+              <a:t>3/21/2016</a:t>
             </a:fld>
             <a:endParaRPr lang="en-US"/>
           </a:p>
@@ -2096,7 +2096,7 @@
           <a:p>
             <a:fld id="{1124D794-5872-47EC-97FC-1653D6C87155}" type="datetimeFigureOut">
               <a:rPr lang="en-US" smtClean="0"/>
-              <a:t>3/10/2016</a:t>
+              <a:t>3/21/2016</a:t>
             </a:fld>
             <a:endParaRPr lang="en-US"/>
           </a:p>
@@ -2353,7 +2353,7 @@
           <a:p>
             <a:fld id="{1124D794-5872-47EC-97FC-1653D6C87155}" type="datetimeFigureOut">
               <a:rPr lang="en-US" smtClean="0"/>
-              <a:t>3/10/2016</a:t>
+              <a:t>3/21/2016</a:t>
             </a:fld>
             <a:endParaRPr lang="en-US"/>
           </a:p>
@@ -2566,7 +2566,7 @@
           <a:p>
             <a:fld id="{1124D794-5872-47EC-97FC-1653D6C87155}" type="datetimeFigureOut">
               <a:rPr lang="en-US" smtClean="0"/>
-              <a:t>3/10/2016</a:t>
+              <a:t>3/21/2016</a:t>
             </a:fld>
             <a:endParaRPr lang="en-US"/>
           </a:p>
@@ -3000,6 +3000,54 @@
           </a:prstGeom>
         </p:spPr>
       </p:pic>
+      <p:sp>
+        <p:nvSpPr>
+          <p:cNvPr id="68" name="Rectangle 67"/>
+          <p:cNvSpPr/>
+          <p:nvPr/>
+        </p:nvSpPr>
+        <p:spPr>
+          <a:xfrm rot="20569990">
+            <a:off x="324799" y="162369"/>
+            <a:ext cx="5020093" cy="774734"/>
+          </a:xfrm>
+          <a:prstGeom prst="rect">
+            <a:avLst/>
+          </a:prstGeom>
+          <a:solidFill>
+            <a:schemeClr val="accent1">
+              <a:alpha val="60000"/>
+            </a:schemeClr>
+          </a:solidFill>
+          <a:ln>
+            <a:noFill/>
+          </a:ln>
+        </p:spPr>
+        <p:style>
+          <a:lnRef idx="2">
+            <a:schemeClr val="accent1">
+              <a:shade val="50000"/>
+            </a:schemeClr>
+          </a:lnRef>
+          <a:fillRef idx="1">
+            <a:schemeClr val="accent1"/>
+          </a:fillRef>
+          <a:effectRef idx="0">
+            <a:schemeClr val="accent1"/>
+          </a:effectRef>
+          <a:fontRef idx="minor">
+            <a:schemeClr val="lt1"/>
+          </a:fontRef>
+        </p:style>
+        <p:txBody>
+          <a:bodyPr rtlCol="0" anchor="ctr"/>
+          <a:lstStyle/>
+          <a:p>
+            <a:pPr algn="ctr"/>
+            <a:endParaRPr lang="en-US"/>
+          </a:p>
+        </p:txBody>
+      </p:sp>
       <p:grpSp>
         <p:nvGrpSpPr>
           <p:cNvPr id="61" name="Group 60"/>
@@ -3320,39 +3368,6 @@
       </p:cxnSp>
       <p:sp>
         <p:nvSpPr>
-          <p:cNvPr id="7" name="TextBox 6"/>
-          <p:cNvSpPr txBox="1"/>
-          <p:nvPr/>
-        </p:nvSpPr>
-        <p:spPr>
-          <a:xfrm>
-            <a:off x="125890" y="88844"/>
-            <a:ext cx="379562" cy="400110"/>
-          </a:xfrm>
-          <a:prstGeom prst="rect">
-            <a:avLst/>
-          </a:prstGeom>
-          <a:noFill/>
-        </p:spPr>
-        <p:txBody>
-          <a:bodyPr wrap="square" rtlCol="0">
-            <a:spAutoFit/>
-          </a:bodyPr>
-          <a:lstStyle/>
-          <a:p>
-            <a:r>
-              <a:rPr lang="en-US" sz="2000" dirty="0">
-                <a:solidFill>
-                  <a:schemeClr val="bg1"/>
-                </a:solidFill>
-              </a:rPr>
-              <a:t>a.</a:t>
-            </a:r>
-          </a:p>
-        </p:txBody>
-      </p:sp>
-      <p:sp>
-        <p:nvSpPr>
           <p:cNvPr id="12" name="TextBox 11"/>
           <p:cNvSpPr txBox="1"/>
           <p:nvPr/>
@@ -4770,6 +4785,224 @@
           </a:p>
         </p:txBody>
       </p:sp>
+      <p:cxnSp>
+        <p:nvCxnSpPr>
+          <p:cNvPr id="52" name="Straight Connector 51"/>
+          <p:cNvCxnSpPr/>
+          <p:nvPr/>
+        </p:nvCxnSpPr>
+        <p:spPr>
+          <a:xfrm flipH="1">
+            <a:off x="6943724" y="8206202"/>
+            <a:ext cx="110219" cy="0"/>
+          </a:xfrm>
+          <a:prstGeom prst="line">
+            <a:avLst/>
+          </a:prstGeom>
+        </p:spPr>
+        <p:style>
+          <a:lnRef idx="1">
+            <a:schemeClr val="accent1"/>
+          </a:lnRef>
+          <a:fillRef idx="0">
+            <a:schemeClr val="accent1"/>
+          </a:fillRef>
+          <a:effectRef idx="0">
+            <a:schemeClr val="accent1"/>
+          </a:effectRef>
+          <a:fontRef idx="minor">
+            <a:schemeClr val="tx1"/>
+          </a:fontRef>
+        </p:style>
+      </p:cxnSp>
+      <p:grpSp>
+        <p:nvGrpSpPr>
+          <p:cNvPr id="53" name="Group 52"/>
+          <p:cNvGrpSpPr/>
+          <p:nvPr/>
+        </p:nvGrpSpPr>
+        <p:grpSpPr>
+          <a:xfrm>
+            <a:off x="170713" y="121263"/>
+            <a:ext cx="411489" cy="373773"/>
+            <a:chOff x="7536036" y="2709145"/>
+            <a:chExt cx="1871820" cy="373773"/>
+          </a:xfrm>
+        </p:grpSpPr>
+        <p:sp>
+          <p:nvSpPr>
+            <p:cNvPr id="54" name="Rectangle 53"/>
+            <p:cNvSpPr/>
+            <p:nvPr/>
+          </p:nvSpPr>
+          <p:spPr>
+            <a:xfrm>
+              <a:off x="7581756" y="2709145"/>
+              <a:ext cx="1802981" cy="373773"/>
+            </a:xfrm>
+            <a:prstGeom prst="rect">
+              <a:avLst/>
+            </a:prstGeom>
+            <a:solidFill>
+              <a:schemeClr val="accent1">
+                <a:alpha val="60000"/>
+              </a:schemeClr>
+            </a:solidFill>
+            <a:ln>
+              <a:noFill/>
+            </a:ln>
+          </p:spPr>
+          <p:style>
+            <a:lnRef idx="2">
+              <a:schemeClr val="accent1">
+                <a:shade val="50000"/>
+              </a:schemeClr>
+            </a:lnRef>
+            <a:fillRef idx="1">
+              <a:schemeClr val="accent1"/>
+            </a:fillRef>
+            <a:effectRef idx="0">
+              <a:schemeClr val="accent1"/>
+            </a:effectRef>
+            <a:fontRef idx="minor">
+              <a:schemeClr val="lt1"/>
+            </a:fontRef>
+          </p:style>
+          <p:txBody>
+            <a:bodyPr rtlCol="0" anchor="ctr"/>
+            <a:lstStyle/>
+            <a:p>
+              <a:pPr algn="ctr"/>
+              <a:endParaRPr lang="en-US"/>
+            </a:p>
+          </p:txBody>
+        </p:sp>
+        <p:sp>
+          <p:nvSpPr>
+            <p:cNvPr id="65" name="TextBox 64"/>
+            <p:cNvSpPr txBox="1"/>
+            <p:nvPr/>
+          </p:nvSpPr>
+          <p:spPr>
+            <a:xfrm>
+              <a:off x="7536036" y="2713586"/>
+              <a:ext cx="1871820" cy="369332"/>
+            </a:xfrm>
+            <a:prstGeom prst="rect">
+              <a:avLst/>
+            </a:prstGeom>
+            <a:noFill/>
+            <a:ln>
+              <a:noFill/>
+            </a:ln>
+          </p:spPr>
+          <p:txBody>
+            <a:bodyPr wrap="square" rtlCol="0">
+              <a:spAutoFit/>
+            </a:bodyPr>
+            <a:lstStyle/>
+            <a:p>
+              <a:pPr algn="ctr"/>
+              <a:r>
+                <a:rPr lang="en-US" sz="1800" dirty="0" smtClean="0">
+                  <a:solidFill>
+                    <a:schemeClr val="bg1"/>
+                  </a:solidFill>
+                </a:rPr>
+                <a:t>a.</a:t>
+              </a:r>
+              <a:endParaRPr lang="en-US" sz="1800" dirty="0">
+                <a:solidFill>
+                  <a:schemeClr val="bg1"/>
+                </a:solidFill>
+              </a:endParaRPr>
+            </a:p>
+          </p:txBody>
+        </p:sp>
+      </p:grpSp>
+      <p:sp>
+        <p:nvSpPr>
+          <p:cNvPr id="38" name="Rectangle 37"/>
+          <p:cNvSpPr/>
+          <p:nvPr/>
+        </p:nvSpPr>
+        <p:spPr>
+          <a:xfrm>
+            <a:off x="2861310" y="-655320"/>
+            <a:ext cx="2567940" cy="742950"/>
+          </a:xfrm>
+          <a:prstGeom prst="rect">
+            <a:avLst/>
+          </a:prstGeom>
+          <a:solidFill>
+            <a:schemeClr val="bg1"/>
+          </a:solidFill>
+          <a:ln>
+            <a:noFill/>
+          </a:ln>
+        </p:spPr>
+        <p:style>
+          <a:lnRef idx="2">
+            <a:schemeClr val="accent1">
+              <a:shade val="50000"/>
+            </a:schemeClr>
+          </a:lnRef>
+          <a:fillRef idx="1">
+            <a:schemeClr val="accent1"/>
+          </a:fillRef>
+          <a:effectRef idx="0">
+            <a:schemeClr val="accent1"/>
+          </a:effectRef>
+          <a:fontRef idx="minor">
+            <a:schemeClr val="lt1"/>
+          </a:fontRef>
+        </p:style>
+        <p:txBody>
+          <a:bodyPr rtlCol="0" anchor="ctr"/>
+          <a:lstStyle/>
+          <a:p>
+            <a:pPr algn="ctr"/>
+            <a:endParaRPr lang="en-US"/>
+          </a:p>
+        </p:txBody>
+      </p:sp>
+      <p:cxnSp>
+        <p:nvCxnSpPr>
+          <p:cNvPr id="42" name="Straight Connector 41"/>
+          <p:cNvCxnSpPr/>
+          <p:nvPr/>
+        </p:nvCxnSpPr>
+        <p:spPr>
+          <a:xfrm>
+            <a:off x="2264590" y="-7620"/>
+            <a:ext cx="3164660" cy="0"/>
+          </a:xfrm>
+          <a:prstGeom prst="line">
+            <a:avLst/>
+          </a:prstGeom>
+          <a:ln>
+            <a:solidFill>
+              <a:schemeClr val="bg1">
+                <a:lumMod val="75000"/>
+              </a:schemeClr>
+            </a:solidFill>
+          </a:ln>
+        </p:spPr>
+        <p:style>
+          <a:lnRef idx="1">
+            <a:schemeClr val="accent1"/>
+          </a:lnRef>
+          <a:fillRef idx="0">
+            <a:schemeClr val="accent1"/>
+          </a:fillRef>
+          <a:effectRef idx="0">
+            <a:schemeClr val="accent1"/>
+          </a:effectRef>
+          <a:fontRef idx="minor">
+            <a:schemeClr val="tx1"/>
+          </a:fontRef>
+        </p:style>
+      </p:cxnSp>
     </p:spTree>
     <p:extLst>
       <p:ext uri="{BB962C8B-B14F-4D97-AF65-F5344CB8AC3E}">

</xml_diff>